<commit_message>
added info on addressing
</commit_message>
<xml_diff>
--- a/cs447_lab4_june6.pptx
+++ b/cs447_lab4_june6.pptx
@@ -235,7 +235,7 @@
           <a:p>
             <a:fld id="{79DACF82-7282-4538-9925-81D795D18BF0}" type="datetimeFigureOut">
               <a:rPr lang="en-US" smtClean="0"/>
-              <a:t>6/5/2018</a:t>
+              <a:t>6/6/2018</a:t>
             </a:fld>
             <a:endParaRPr lang="en-US"/>
           </a:p>
@@ -633,7 +633,7 @@
           <a:p>
             <a:fld id="{7880F47B-3C72-48E5-9CD2-8B9AE0E9AFF7}" type="datetimeFigureOut">
               <a:rPr lang="en-US" smtClean="0"/>
-              <a:t>6/5/2018</a:t>
+              <a:t>6/6/2018</a:t>
             </a:fld>
             <a:endParaRPr lang="en-US"/>
           </a:p>
@@ -803,7 +803,7 @@
           <a:p>
             <a:fld id="{7880F47B-3C72-48E5-9CD2-8B9AE0E9AFF7}" type="datetimeFigureOut">
               <a:rPr lang="en-US" smtClean="0"/>
-              <a:t>6/5/2018</a:t>
+              <a:t>6/6/2018</a:t>
             </a:fld>
             <a:endParaRPr lang="en-US"/>
           </a:p>
@@ -983,7 +983,7 @@
           <a:p>
             <a:fld id="{7880F47B-3C72-48E5-9CD2-8B9AE0E9AFF7}" type="datetimeFigureOut">
               <a:rPr lang="en-US" smtClean="0"/>
-              <a:t>6/5/2018</a:t>
+              <a:t>6/6/2018</a:t>
             </a:fld>
             <a:endParaRPr lang="en-US"/>
           </a:p>
@@ -1153,7 +1153,7 @@
           <a:p>
             <a:fld id="{7880F47B-3C72-48E5-9CD2-8B9AE0E9AFF7}" type="datetimeFigureOut">
               <a:rPr lang="en-US" smtClean="0"/>
-              <a:t>6/5/2018</a:t>
+              <a:t>6/6/2018</a:t>
             </a:fld>
             <a:endParaRPr lang="en-US"/>
           </a:p>
@@ -1397,7 +1397,7 @@
           <a:p>
             <a:fld id="{7880F47B-3C72-48E5-9CD2-8B9AE0E9AFF7}" type="datetimeFigureOut">
               <a:rPr lang="en-US" smtClean="0"/>
-              <a:t>6/5/2018</a:t>
+              <a:t>6/6/2018</a:t>
             </a:fld>
             <a:endParaRPr lang="en-US"/>
           </a:p>
@@ -1629,7 +1629,7 @@
           <a:p>
             <a:fld id="{7880F47B-3C72-48E5-9CD2-8B9AE0E9AFF7}" type="datetimeFigureOut">
               <a:rPr lang="en-US" smtClean="0"/>
-              <a:t>6/5/2018</a:t>
+              <a:t>6/6/2018</a:t>
             </a:fld>
             <a:endParaRPr lang="en-US"/>
           </a:p>
@@ -1996,7 +1996,7 @@
           <a:p>
             <a:fld id="{7880F47B-3C72-48E5-9CD2-8B9AE0E9AFF7}" type="datetimeFigureOut">
               <a:rPr lang="en-US" smtClean="0"/>
-              <a:t>6/5/2018</a:t>
+              <a:t>6/6/2018</a:t>
             </a:fld>
             <a:endParaRPr lang="en-US"/>
           </a:p>
@@ -2114,7 +2114,7 @@
           <a:p>
             <a:fld id="{7880F47B-3C72-48E5-9CD2-8B9AE0E9AFF7}" type="datetimeFigureOut">
               <a:rPr lang="en-US" smtClean="0"/>
-              <a:t>6/5/2018</a:t>
+              <a:t>6/6/2018</a:t>
             </a:fld>
             <a:endParaRPr lang="en-US"/>
           </a:p>
@@ -2209,7 +2209,7 @@
           <a:p>
             <a:fld id="{7880F47B-3C72-48E5-9CD2-8B9AE0E9AFF7}" type="datetimeFigureOut">
               <a:rPr lang="en-US" smtClean="0"/>
-              <a:t>6/5/2018</a:t>
+              <a:t>6/6/2018</a:t>
             </a:fld>
             <a:endParaRPr lang="en-US"/>
           </a:p>
@@ -2486,7 +2486,7 @@
           <a:p>
             <a:fld id="{7880F47B-3C72-48E5-9CD2-8B9AE0E9AFF7}" type="datetimeFigureOut">
               <a:rPr lang="en-US" smtClean="0"/>
-              <a:t>6/5/2018</a:t>
+              <a:t>6/6/2018</a:t>
             </a:fld>
             <a:endParaRPr lang="en-US"/>
           </a:p>
@@ -2743,7 +2743,7 @@
           <a:p>
             <a:fld id="{7880F47B-3C72-48E5-9CD2-8B9AE0E9AFF7}" type="datetimeFigureOut">
               <a:rPr lang="en-US" smtClean="0"/>
-              <a:t>6/5/2018</a:t>
+              <a:t>6/6/2018</a:t>
             </a:fld>
             <a:endParaRPr lang="en-US"/>
           </a:p>
@@ -2956,7 +2956,7 @@
           <a:p>
             <a:fld id="{7880F47B-3C72-48E5-9CD2-8B9AE0E9AFF7}" type="datetimeFigureOut">
               <a:rPr lang="en-US" smtClean="0"/>
-              <a:t>6/5/2018</a:t>
+              <a:t>6/6/2018</a:t>
             </a:fld>
             <a:endParaRPr lang="en-US"/>
           </a:p>
@@ -3388,7 +3388,23 @@
                   <a:srgbClr val="002060"/>
                 </a:solidFill>
               </a:rPr>
-              <a:t>CS447 Recitation #2: 6/6/18</a:t>
+              <a:t>CS447 Recitation </a:t>
+            </a:r>
+            <a:r>
+              <a:rPr lang="en-US" sz="2800" dirty="0" smtClean="0">
+                <a:solidFill>
+                  <a:srgbClr val="002060"/>
+                </a:solidFill>
+              </a:rPr>
+              <a:t>#4: </a:t>
+            </a:r>
+            <a:r>
+              <a:rPr lang="en-US" sz="2800" dirty="0">
+                <a:solidFill>
+                  <a:srgbClr val="002060"/>
+                </a:solidFill>
+              </a:rPr>
+              <a:t>6/6/18</a:t>
             </a:r>
           </a:p>
         </p:txBody>
@@ -3533,6 +3549,13 @@
   <p:clrMapOvr>
     <a:masterClrMapping/>
   </p:clrMapOvr>
+  <p:timing>
+    <p:tnLst>
+      <p:par>
+        <p:cTn id="1" dur="indefinite" restart="never" nodeType="tmRoot"/>
+      </p:par>
+    </p:tnLst>
+  </p:timing>
 </p:sld>
 </file>
 
@@ -3714,6 +3737,13 @@
   <p:clrMapOvr>
     <a:masterClrMapping/>
   </p:clrMapOvr>
+  <p:timing>
+    <p:tnLst>
+      <p:par>
+        <p:cTn id="1" dur="indefinite" restart="never" nodeType="tmRoot"/>
+      </p:par>
+    </p:tnLst>
+  </p:timing>
 </p:sld>
 </file>
 
@@ -3896,6 +3926,13 @@
   <p:clrMapOvr>
     <a:masterClrMapping/>
   </p:clrMapOvr>
+  <p:timing>
+    <p:tnLst>
+      <p:par>
+        <p:cTn id="1" dur="indefinite" restart="never" nodeType="tmRoot"/>
+      </p:par>
+    </p:tnLst>
+  </p:timing>
 </p:sld>
 </file>
 
@@ -4092,6 +4129,73 @@
           </a:prstGeom>
         </p:spPr>
       </p:pic>
+      <p:cxnSp>
+        <p:nvCxnSpPr>
+          <p:cNvPr id="3" name="Straight Arrow Connector 2"/>
+          <p:cNvCxnSpPr/>
+          <p:nvPr/>
+        </p:nvCxnSpPr>
+        <p:spPr>
+          <a:xfrm flipH="1">
+            <a:off x="4909352" y="355476"/>
+            <a:ext cx="1935332" cy="523220"/>
+          </a:xfrm>
+          <a:prstGeom prst="straightConnector1">
+            <a:avLst/>
+          </a:prstGeom>
+          <a:ln w="38100">
+            <a:tailEnd type="triangle"/>
+          </a:ln>
+        </p:spPr>
+        <p:style>
+          <a:lnRef idx="1">
+            <a:schemeClr val="accent1"/>
+          </a:lnRef>
+          <a:fillRef idx="0">
+            <a:schemeClr val="accent1"/>
+          </a:fillRef>
+          <a:effectRef idx="0">
+            <a:schemeClr val="accent1"/>
+          </a:effectRef>
+          <a:fontRef idx="minor">
+            <a:schemeClr val="tx1"/>
+          </a:fontRef>
+        </p:style>
+      </p:cxnSp>
+      <p:sp>
+        <p:nvSpPr>
+          <p:cNvPr id="7" name="TextBox 6"/>
+          <p:cNvSpPr txBox="1"/>
+          <p:nvPr/>
+        </p:nvSpPr>
+        <p:spPr>
+          <a:xfrm>
+            <a:off x="7102136" y="167744"/>
+            <a:ext cx="1322773" cy="369332"/>
+          </a:xfrm>
+          <a:prstGeom prst="rect">
+            <a:avLst/>
+          </a:prstGeom>
+          <a:noFill/>
+        </p:spPr>
+        <p:txBody>
+          <a:bodyPr wrap="square" rtlCol="0">
+            <a:spAutoFit/>
+          </a:bodyPr>
+          <a:lstStyle/>
+          <a:p>
+            <a:r>
+              <a:rPr lang="en-US" dirty="0" err="1" smtClean="0"/>
+              <a:t>Syscall</a:t>
+            </a:r>
+            <a:r>
+              <a:rPr lang="en-US" dirty="0" smtClean="0"/>
+              <a:t> 8</a:t>
+            </a:r>
+            <a:endParaRPr lang="en-US" dirty="0"/>
+          </a:p>
+        </p:txBody>
+      </p:sp>
     </p:spTree>
     <p:extLst>
       <p:ext uri="{BB962C8B-B14F-4D97-AF65-F5344CB8AC3E}">
@@ -4102,6 +4206,13 @@
   <p:clrMapOvr>
     <a:masterClrMapping/>
   </p:clrMapOvr>
+  <p:timing>
+    <p:tnLst>
+      <p:par>
+        <p:cTn id="1" dur="indefinite" restart="never" nodeType="tmRoot"/>
+      </p:par>
+    </p:tnLst>
+  </p:timing>
 </p:sld>
 </file>
 
@@ -4277,6 +4388,13 @@
   <p:clrMapOvr>
     <a:masterClrMapping/>
   </p:clrMapOvr>
+  <p:timing>
+    <p:tnLst>
+      <p:par>
+        <p:cTn id="1" dur="indefinite" restart="never" nodeType="tmRoot"/>
+      </p:par>
+    </p:tnLst>
+  </p:timing>
 </p:sld>
 </file>
 
@@ -4580,6 +4698,13 @@
   <p:clrMapOvr>
     <a:masterClrMapping/>
   </p:clrMapOvr>
+  <p:timing>
+    <p:tnLst>
+      <p:par>
+        <p:cTn id="1" dur="indefinite" restart="never" nodeType="tmRoot"/>
+      </p:par>
+    </p:tnLst>
+  </p:timing>
 </p:sld>
 </file>
 
@@ -4924,6 +5049,13 @@
   <p:clrMapOvr>
     <a:masterClrMapping/>
   </p:clrMapOvr>
+  <p:timing>
+    <p:tnLst>
+      <p:par>
+        <p:cTn id="1" dur="indefinite" restart="never" nodeType="tmRoot"/>
+      </p:par>
+    </p:tnLst>
+  </p:timing>
 </p:sld>
 </file>
 
@@ -5103,6 +5235,13 @@
   <p:clrMapOvr>
     <a:masterClrMapping/>
   </p:clrMapOvr>
+  <p:timing>
+    <p:tnLst>
+      <p:par>
+        <p:cTn id="1" dur="indefinite" restart="never" nodeType="tmRoot"/>
+      </p:par>
+    </p:tnLst>
+  </p:timing>
 </p:sld>
 </file>
 
@@ -5279,6 +5418,13 @@
   <p:clrMapOvr>
     <a:masterClrMapping/>
   </p:clrMapOvr>
+  <p:timing>
+    <p:tnLst>
+      <p:par>
+        <p:cTn id="1" dur="indefinite" restart="never" nodeType="tmRoot"/>
+      </p:par>
+    </p:tnLst>
+  </p:timing>
 </p:sld>
 </file>
 
@@ -6267,6 +6413,13 @@
   <p:clrMapOvr>
     <a:masterClrMapping/>
   </p:clrMapOvr>
+  <p:timing>
+    <p:tnLst>
+      <p:par>
+        <p:cTn id="1" dur="indefinite" restart="never" nodeType="tmRoot"/>
+      </p:par>
+    </p:tnLst>
+  </p:timing>
 </p:sld>
 </file>
 
@@ -6625,6 +6778,13 @@
   <p:clrMapOvr>
     <a:masterClrMapping/>
   </p:clrMapOvr>
+  <p:timing>
+    <p:tnLst>
+      <p:par>
+        <p:cTn id="1" dur="indefinite" restart="never" nodeType="tmRoot"/>
+      </p:par>
+    </p:tnLst>
+  </p:timing>
 </p:sld>
 </file>
 
@@ -6894,6 +7054,13 @@
   <p:clrMapOvr>
     <a:masterClrMapping/>
   </p:clrMapOvr>
+  <p:timing>
+    <p:tnLst>
+      <p:par>
+        <p:cTn id="1" dur="indefinite" restart="never" nodeType="tmRoot"/>
+      </p:par>
+    </p:tnLst>
+  </p:timing>
 </p:sld>
 </file>
 
@@ -7106,6 +7273,13 @@
   <p:clrMapOvr>
     <a:masterClrMapping/>
   </p:clrMapOvr>
+  <p:timing>
+    <p:tnLst>
+      <p:par>
+        <p:cTn id="1" dur="indefinite" restart="never" nodeType="tmRoot"/>
+      </p:par>
+    </p:tnLst>
+  </p:timing>
 </p:sld>
 </file>
 
@@ -7338,6 +7512,13 @@
   <p:clrMapOvr>
     <a:masterClrMapping/>
   </p:clrMapOvr>
+  <p:timing>
+    <p:tnLst>
+      <p:par>
+        <p:cTn id="1" dur="indefinite" restart="never" nodeType="tmRoot"/>
+      </p:par>
+    </p:tnLst>
+  </p:timing>
 </p:sld>
 </file>
 
@@ -7453,7 +7634,7 @@
         <p:spPr>
           <a:xfrm>
             <a:off x="524144" y="3264331"/>
-            <a:ext cx="7609921" cy="1200329"/>
+            <a:ext cx="6879833" cy="2585323"/>
           </a:xfrm>
           <a:prstGeom prst="rect">
             <a:avLst/>
@@ -7512,6 +7693,57 @@
               <a:rPr lang="en-US" b="1" dirty="0"/>
               <a:t> </a:t>
             </a:r>
+            <a:endParaRPr lang="en-US" b="1" dirty="0" smtClean="0"/>
+          </a:p>
+          <a:p>
+            <a:pPr marL="742950" lvl="1" indent="-285750">
+              <a:buFont typeface="Arial" panose="020B0604020202020204" pitchFamily="34" charset="0"/>
+              <a:buChar char="•"/>
+            </a:pPr>
+            <a:endParaRPr lang="en-US" b="1" dirty="0"/>
+          </a:p>
+          <a:p>
+            <a:pPr marL="285750" indent="-285750">
+              <a:buFont typeface="Arial" panose="020B0604020202020204" pitchFamily="34" charset="0"/>
+              <a:buChar char="•"/>
+            </a:pPr>
+            <a:r>
+              <a:rPr lang="en-US" dirty="0" smtClean="0"/>
+              <a:t>Variable addressing (for incrementing in a loop):</a:t>
+            </a:r>
+          </a:p>
+          <a:p>
+            <a:pPr marL="742950" lvl="1" indent="-285750">
+              <a:buFont typeface="Arial" panose="020B0604020202020204" pitchFamily="34" charset="0"/>
+              <a:buChar char="•"/>
+            </a:pPr>
+            <a:r>
+              <a:rPr lang="en-US" dirty="0" err="1" smtClean="0"/>
+              <a:t>lbu</a:t>
+            </a:r>
+            <a:r>
+              <a:rPr lang="en-US" dirty="0" smtClean="0"/>
+              <a:t> $t0($t1) is not recognized as valid syntax</a:t>
+            </a:r>
+          </a:p>
+          <a:p>
+            <a:pPr marL="742950" lvl="1" indent="-285750">
+              <a:buFont typeface="Arial" panose="020B0604020202020204" pitchFamily="34" charset="0"/>
+              <a:buChar char="•"/>
+            </a:pPr>
+            <a:r>
+              <a:rPr lang="en-US" dirty="0" smtClean="0"/>
+              <a:t>One option: </a:t>
+            </a:r>
+            <a:r>
+              <a:rPr lang="en-US" dirty="0" err="1" smtClean="0"/>
+              <a:t>lbu</a:t>
+            </a:r>
+            <a:r>
+              <a:rPr lang="en-US" dirty="0" smtClean="0"/>
+              <a:t> 0($t1), where $t1 is incremented by one byte on each loop</a:t>
+            </a:r>
+            <a:endParaRPr lang="en-US" dirty="0"/>
           </a:p>
         </p:txBody>
       </p:sp>
@@ -7525,6 +7757,13 @@
   <p:clrMapOvr>
     <a:masterClrMapping/>
   </p:clrMapOvr>
+  <p:timing>
+    <p:tnLst>
+      <p:par>
+        <p:cTn id="1" dur="indefinite" restart="never" nodeType="tmRoot"/>
+      </p:par>
+    </p:tnLst>
+  </p:timing>
 </p:sld>
 </file>
 

</xml_diff>